<commit_message>
Repository 추가 및 CLOSE_WAIT 관련 문서 추가
</commit_message>
<xml_diff>
--- a/Spring4MVCAngularJSExample/src/doc/AWS BeansTalk 활용한 스케일링.pptx
+++ b/Spring4MVCAngularJSExample/src/doc/AWS BeansTalk 활용한 스케일링.pptx
@@ -17,8 +17,8 @@
     <p:sldId id="263" r:id="rId11"/>
     <p:sldId id="264" r:id="rId12"/>
     <p:sldId id="265" r:id="rId13"/>
-    <p:sldId id="266" r:id="rId14"/>
-    <p:sldId id="267" r:id="rId15"/>
+    <p:sldId id="267" r:id="rId14"/>
+    <p:sldId id="266" r:id="rId15"/>
     <p:sldId id="271" r:id="rId16"/>
     <p:sldId id="268" r:id="rId17"/>
     <p:sldId id="269" r:id="rId18"/>
@@ -3732,6 +3732,138 @@
       </p:sp>
       <p:pic>
         <p:nvPicPr>
+          <p:cNvPr id="12290" name="Picture 2"/>
+          <p:cNvPicPr>
+            <a:picLocks noChangeAspect="1" noChangeArrowheads="1"/>
+          </p:cNvPicPr>
+          <p:nvPr/>
+        </p:nvPicPr>
+        <p:blipFill>
+          <a:blip r:embed="rId2">
+            <a:extLst>
+              <a:ext uri="{28A0092B-C50C-407E-A947-70E740481C1C}">
+                <a14:useLocalDpi xmlns:a14="http://schemas.microsoft.com/office/drawing/2010/main" val="0"/>
+              </a:ext>
+            </a:extLst>
+          </a:blip>
+          <a:srcRect/>
+          <a:stretch>
+            <a:fillRect/>
+          </a:stretch>
+        </p:blipFill>
+        <p:spPr bwMode="auto">
+          <a:xfrm>
+            <a:off x="957263" y="0"/>
+            <a:ext cx="7229475" cy="8905875"/>
+          </a:xfrm>
+          <a:prstGeom prst="rect">
+            <a:avLst/>
+          </a:prstGeom>
+          <a:noFill/>
+          <a:ln>
+            <a:noFill/>
+          </a:ln>
+          <a:effectLst/>
+          <a:extLst>
+            <a:ext uri="{909E8E84-426E-40dd-AFC4-6F175D3DCCD1}">
+              <a14:hiddenFill xmlns:a14="http://schemas.microsoft.com/office/drawing/2010/main">
+                <a:solidFill>
+                  <a:schemeClr val="accent1"/>
+                </a:solidFill>
+              </a14:hiddenFill>
+            </a:ext>
+            <a:ext uri="{91240B29-F687-4f45-9708-019B960494DF}">
+              <a14:hiddenLine xmlns:a14="http://schemas.microsoft.com/office/drawing/2010/main" w="9525">
+                <a:solidFill>
+                  <a:schemeClr val="tx1"/>
+                </a:solidFill>
+                <a:miter lim="800000"/>
+                <a:headEnd/>
+                <a:tailEnd/>
+              </a14:hiddenLine>
+            </a:ext>
+            <a:ext uri="{AF507438-7753-43e0-B8FC-AC1667EBCBE1}">
+              <a14:hiddenEffects xmlns:a14="http://schemas.microsoft.com/office/drawing/2010/main">
+                <a:effectLst>
+                  <a:outerShdw dist="35921" dir="2700000" algn="ctr" rotWithShape="0">
+                    <a:schemeClr val="bg2"/>
+                  </a:outerShdw>
+                </a:effectLst>
+              </a14:hiddenEffects>
+            </a:ext>
+          </a:extLst>
+        </p:spPr>
+      </p:pic>
+    </p:spTree>
+    <p:extLst>
+      <p:ext uri="{BB962C8B-B14F-4D97-AF65-F5344CB8AC3E}">
+        <p14:creationId xmlns:p14="http://schemas.microsoft.com/office/powerpoint/2010/main" val="2351890560"/>
+      </p:ext>
+    </p:extLst>
+  </p:cSld>
+  <p:clrMapOvr>
+    <a:masterClrMapping/>
+  </p:clrMapOvr>
+</p:sld>
+</file>
+
+<file path=ppt/slides/slide14.xml><?xml version="1.0" encoding="utf-8"?>
+<p:sld xmlns:a="http://schemas.openxmlformats.org/drawingml/2006/main" xmlns:r="http://schemas.openxmlformats.org/officeDocument/2006/relationships" xmlns:p="http://schemas.openxmlformats.org/presentationml/2006/main">
+  <p:cSld>
+    <p:spTree>
+      <p:nvGrpSpPr>
+        <p:cNvPr id="1" name=""/>
+        <p:cNvGrpSpPr/>
+        <p:nvPr/>
+      </p:nvGrpSpPr>
+      <p:grpSpPr>
+        <a:xfrm>
+          <a:off x="0" y="0"/>
+          <a:ext cx="0" cy="0"/>
+          <a:chOff x="0" y="0"/>
+          <a:chExt cx="0" cy="0"/>
+        </a:xfrm>
+      </p:grpSpPr>
+      <p:sp>
+        <p:nvSpPr>
+          <p:cNvPr id="2" name="제목 1"/>
+          <p:cNvSpPr>
+            <a:spLocks noGrp="1"/>
+          </p:cNvSpPr>
+          <p:nvPr>
+            <p:ph type="title"/>
+          </p:nvPr>
+        </p:nvSpPr>
+        <p:spPr/>
+        <p:txBody>
+          <a:bodyPr/>
+          <a:lstStyle/>
+          <a:p>
+            <a:endParaRPr lang="ko-KR" altLang="en-US"/>
+          </a:p>
+        </p:txBody>
+      </p:sp>
+      <p:sp>
+        <p:nvSpPr>
+          <p:cNvPr id="3" name="내용 개체 틀 2"/>
+          <p:cNvSpPr>
+            <a:spLocks noGrp="1"/>
+          </p:cNvSpPr>
+          <p:nvPr>
+            <p:ph idx="1"/>
+          </p:nvPr>
+        </p:nvSpPr>
+        <p:spPr/>
+        <p:txBody>
+          <a:bodyPr/>
+          <a:lstStyle/>
+          <a:p>
+            <a:endParaRPr lang="ko-KR" altLang="en-US"/>
+          </a:p>
+        </p:txBody>
+      </p:sp>
+      <p:pic>
+        <p:nvPicPr>
           <p:cNvPr id="11266" name="Picture 2"/>
           <p:cNvPicPr>
             <a:picLocks noChangeAspect="1" noChangeArrowheads="1"/>
@@ -3862,138 +3994,6 @@
     <p:extLst>
       <p:ext uri="{BB962C8B-B14F-4D97-AF65-F5344CB8AC3E}">
         <p14:creationId xmlns:p14="http://schemas.microsoft.com/office/powerpoint/2010/main" val="720337768"/>
-      </p:ext>
-    </p:extLst>
-  </p:cSld>
-  <p:clrMapOvr>
-    <a:masterClrMapping/>
-  </p:clrMapOvr>
-</p:sld>
-</file>
-
-<file path=ppt/slides/slide14.xml><?xml version="1.0" encoding="utf-8"?>
-<p:sld xmlns:a="http://schemas.openxmlformats.org/drawingml/2006/main" xmlns:r="http://schemas.openxmlformats.org/officeDocument/2006/relationships" xmlns:p="http://schemas.openxmlformats.org/presentationml/2006/main">
-  <p:cSld>
-    <p:spTree>
-      <p:nvGrpSpPr>
-        <p:cNvPr id="1" name=""/>
-        <p:cNvGrpSpPr/>
-        <p:nvPr/>
-      </p:nvGrpSpPr>
-      <p:grpSpPr>
-        <a:xfrm>
-          <a:off x="0" y="0"/>
-          <a:ext cx="0" cy="0"/>
-          <a:chOff x="0" y="0"/>
-          <a:chExt cx="0" cy="0"/>
-        </a:xfrm>
-      </p:grpSpPr>
-      <p:sp>
-        <p:nvSpPr>
-          <p:cNvPr id="2" name="제목 1"/>
-          <p:cNvSpPr>
-            <a:spLocks noGrp="1"/>
-          </p:cNvSpPr>
-          <p:nvPr>
-            <p:ph type="title"/>
-          </p:nvPr>
-        </p:nvSpPr>
-        <p:spPr/>
-        <p:txBody>
-          <a:bodyPr/>
-          <a:lstStyle/>
-          <a:p>
-            <a:endParaRPr lang="ko-KR" altLang="en-US"/>
-          </a:p>
-        </p:txBody>
-      </p:sp>
-      <p:sp>
-        <p:nvSpPr>
-          <p:cNvPr id="3" name="내용 개체 틀 2"/>
-          <p:cNvSpPr>
-            <a:spLocks noGrp="1"/>
-          </p:cNvSpPr>
-          <p:nvPr>
-            <p:ph idx="1"/>
-          </p:nvPr>
-        </p:nvSpPr>
-        <p:spPr/>
-        <p:txBody>
-          <a:bodyPr/>
-          <a:lstStyle/>
-          <a:p>
-            <a:endParaRPr lang="ko-KR" altLang="en-US"/>
-          </a:p>
-        </p:txBody>
-      </p:sp>
-      <p:pic>
-        <p:nvPicPr>
-          <p:cNvPr id="12290" name="Picture 2"/>
-          <p:cNvPicPr>
-            <a:picLocks noChangeAspect="1" noChangeArrowheads="1"/>
-          </p:cNvPicPr>
-          <p:nvPr/>
-        </p:nvPicPr>
-        <p:blipFill>
-          <a:blip r:embed="rId2">
-            <a:extLst>
-              <a:ext uri="{28A0092B-C50C-407E-A947-70E740481C1C}">
-                <a14:useLocalDpi xmlns:a14="http://schemas.microsoft.com/office/drawing/2010/main" val="0"/>
-              </a:ext>
-            </a:extLst>
-          </a:blip>
-          <a:srcRect/>
-          <a:stretch>
-            <a:fillRect/>
-          </a:stretch>
-        </p:blipFill>
-        <p:spPr bwMode="auto">
-          <a:xfrm>
-            <a:off x="957263" y="0"/>
-            <a:ext cx="7229475" cy="8905875"/>
-          </a:xfrm>
-          <a:prstGeom prst="rect">
-            <a:avLst/>
-          </a:prstGeom>
-          <a:noFill/>
-          <a:ln>
-            <a:noFill/>
-          </a:ln>
-          <a:effectLst/>
-          <a:extLst>
-            <a:ext uri="{909E8E84-426E-40dd-AFC4-6F175D3DCCD1}">
-              <a14:hiddenFill xmlns:a14="http://schemas.microsoft.com/office/drawing/2010/main">
-                <a:solidFill>
-                  <a:schemeClr val="accent1"/>
-                </a:solidFill>
-              </a14:hiddenFill>
-            </a:ext>
-            <a:ext uri="{91240B29-F687-4f45-9708-019B960494DF}">
-              <a14:hiddenLine xmlns:a14="http://schemas.microsoft.com/office/drawing/2010/main" w="9525">
-                <a:solidFill>
-                  <a:schemeClr val="tx1"/>
-                </a:solidFill>
-                <a:miter lim="800000"/>
-                <a:headEnd/>
-                <a:tailEnd/>
-              </a14:hiddenLine>
-            </a:ext>
-            <a:ext uri="{AF507438-7753-43e0-B8FC-AC1667EBCBE1}">
-              <a14:hiddenEffects xmlns:a14="http://schemas.microsoft.com/office/drawing/2010/main">
-                <a:effectLst>
-                  <a:outerShdw dist="35921" dir="2700000" algn="ctr" rotWithShape="0">
-                    <a:schemeClr val="bg2"/>
-                  </a:outerShdw>
-                </a:effectLst>
-              </a14:hiddenEffects>
-            </a:ext>
-          </a:extLst>
-        </p:spPr>
-      </p:pic>
-    </p:spTree>
-    <p:extLst>
-      <p:ext uri="{BB962C8B-B14F-4D97-AF65-F5344CB8AC3E}">
-        <p14:creationId xmlns:p14="http://schemas.microsoft.com/office/powerpoint/2010/main" val="2351890560"/>
       </p:ext>
     </p:extLst>
   </p:cSld>

</xml_diff>